<commit_message>
update analysis and ppt
</commit_message>
<xml_diff>
--- a/presentations/building_permits_presentation.pptx
+++ b/presentations/building_permits_presentation.pptx
@@ -14,7 +14,8 @@
     <p:sldId id="262" r:id="rId8"/>
     <p:sldId id="263" r:id="rId9"/>
     <p:sldId id="264" r:id="rId10"/>
-    <p:sldId id="265" r:id="rId11"/>
+    <p:sldId id="266" r:id="rId11"/>
+    <p:sldId id="265" r:id="rId12"/>
   </p:sldIdLst>
   <p:sldSz cx="12192000" cy="6858000"/>
   <p:notesSz cx="6858000" cy="9144000"/>
@@ -113,6 +114,11 @@
       </a:defRPr>
     </a:lvl9pPr>
   </p:defaultTextStyle>
+  <p:extLst>
+    <p:ext uri="{EFAFB233-063F-42B5-8137-9DF3F51BA10A}">
+      <p15:sldGuideLst xmlns:p15="http://schemas.microsoft.com/office/powerpoint/2012/main"/>
+    </p:ext>
+  </p:extLst>
 </p:presentation>
 </file>
 
@@ -4044,7 +4050,7 @@
           <a:p>
             <a:fld id="{9D0D92BC-42A9-434B-8530-ADBF4485E407}" type="datetimeFigureOut">
               <a:rPr lang="en-US" smtClean="0"/>
-              <a:t>4/6/24</a:t>
+              <a:t>4/18/24</a:t>
             </a:fld>
             <a:endParaRPr lang="en-US"/>
           </a:p>
@@ -4295,7 +4301,7 @@
           <a:p>
             <a:fld id="{9D0D92BC-42A9-434B-8530-ADBF4485E407}" type="datetimeFigureOut">
               <a:rPr lang="en-US" smtClean="0"/>
-              <a:t>4/6/24</a:t>
+              <a:t>4/18/24</a:t>
             </a:fld>
             <a:endParaRPr lang="en-US"/>
           </a:p>
@@ -4503,7 +4509,7 @@
           <a:p>
             <a:fld id="{9D0D92BC-42A9-434B-8530-ADBF4485E407}" type="datetimeFigureOut">
               <a:rPr lang="en-US" smtClean="0"/>
-              <a:t>4/6/24</a:t>
+              <a:t>4/18/24</a:t>
             </a:fld>
             <a:endParaRPr lang="en-US"/>
           </a:p>
@@ -4701,7 +4707,7 @@
           <a:p>
             <a:fld id="{9D0D92BC-42A9-434B-8530-ADBF4485E407}" type="datetimeFigureOut">
               <a:rPr lang="en-US" smtClean="0"/>
-              <a:t>4/6/24</a:t>
+              <a:t>4/18/24</a:t>
             </a:fld>
             <a:endParaRPr lang="en-US"/>
           </a:p>
@@ -4981,7 +4987,7 @@
           <a:p>
             <a:fld id="{9D0D92BC-42A9-434B-8530-ADBF4485E407}" type="datetimeFigureOut">
               <a:rPr lang="en-US" smtClean="0"/>
-              <a:t>4/6/24</a:t>
+              <a:t>4/18/24</a:t>
             </a:fld>
             <a:endParaRPr lang="en-US"/>
           </a:p>
@@ -5289,7 +5295,7 @@
           <a:p>
             <a:fld id="{9D0D92BC-42A9-434B-8530-ADBF4485E407}" type="datetimeFigureOut">
               <a:rPr lang="en-US" smtClean="0"/>
-              <a:t>4/6/24</a:t>
+              <a:t>4/18/24</a:t>
             </a:fld>
             <a:endParaRPr lang="en-US"/>
           </a:p>
@@ -5709,7 +5715,7 @@
           <a:p>
             <a:fld id="{9D0D92BC-42A9-434B-8530-ADBF4485E407}" type="datetimeFigureOut">
               <a:rPr lang="en-US" smtClean="0"/>
-              <a:t>4/6/24</a:t>
+              <a:t>4/18/24</a:t>
             </a:fld>
             <a:endParaRPr lang="en-US"/>
           </a:p>
@@ -5941,7 +5947,7 @@
           <a:p>
             <a:fld id="{9D0D92BC-42A9-434B-8530-ADBF4485E407}" type="datetimeFigureOut">
               <a:rPr lang="en-US" smtClean="0"/>
-              <a:t>4/6/24</a:t>
+              <a:t>4/18/24</a:t>
             </a:fld>
             <a:endParaRPr lang="en-US"/>
           </a:p>
@@ -6054,7 +6060,7 @@
           <a:p>
             <a:fld id="{9D0D92BC-42A9-434B-8530-ADBF4485E407}" type="datetimeFigureOut">
               <a:rPr lang="en-US" smtClean="0"/>
-              <a:t>4/6/24</a:t>
+              <a:t>4/18/24</a:t>
             </a:fld>
             <a:endParaRPr lang="en-US"/>
           </a:p>
@@ -6371,7 +6377,7 @@
           <a:p>
             <a:fld id="{9D0D92BC-42A9-434B-8530-ADBF4485E407}" type="datetimeFigureOut">
               <a:rPr lang="en-US" smtClean="0"/>
-              <a:t>4/6/24</a:t>
+              <a:t>4/18/24</a:t>
             </a:fld>
             <a:endParaRPr lang="en-US"/>
           </a:p>
@@ -6663,7 +6669,7 @@
           <a:p>
             <a:fld id="{9D0D92BC-42A9-434B-8530-ADBF4485E407}" type="datetimeFigureOut">
               <a:rPr lang="en-US" smtClean="0"/>
-              <a:t>4/6/24</a:t>
+              <a:t>4/18/24</a:t>
             </a:fld>
             <a:endParaRPr lang="en-US"/>
           </a:p>
@@ -6970,7 +6976,7 @@
             <a:fld id="{9D0D92BC-42A9-434B-8530-ADBF4485E407}" type="datetimeFigureOut">
               <a:rPr lang="en-US" smtClean="0"/>
               <a:pPr/>
-              <a:t>4/6/24</a:t>
+              <a:t>4/18/24</a:t>
             </a:fld>
             <a:endParaRPr lang="en-US" dirty="0"/>
           </a:p>
@@ -7779,6 +7785,585 @@
 <file path=ppt/slides/slide10.xml><?xml version="1.0" encoding="utf-8"?>
 <p:sld xmlns:a="http://schemas.openxmlformats.org/drawingml/2006/main" xmlns:r="http://schemas.openxmlformats.org/officeDocument/2006/relationships" xmlns:p="http://schemas.openxmlformats.org/presentationml/2006/main">
   <p:cSld>
+    <p:spTree>
+      <p:nvGrpSpPr>
+        <p:cNvPr id="1" name=""/>
+        <p:cNvGrpSpPr/>
+        <p:nvPr/>
+      </p:nvGrpSpPr>
+      <p:grpSpPr>
+        <a:xfrm>
+          <a:off x="0" y="0"/>
+          <a:ext cx="0" cy="0"/>
+          <a:chOff x="0" y="0"/>
+          <a:chExt cx="0" cy="0"/>
+        </a:xfrm>
+      </p:grpSpPr>
+      <p:sp>
+        <p:nvSpPr>
+          <p:cNvPr id="2" name="Title 1">
+            <a:extLst>
+              <a:ext uri="{FF2B5EF4-FFF2-40B4-BE49-F238E27FC236}">
+                <a16:creationId xmlns:a16="http://schemas.microsoft.com/office/drawing/2014/main" id="{48412D6C-8B9A-4092-E5D2-D6218ADE9448}"/>
+              </a:ext>
+            </a:extLst>
+          </p:cNvPr>
+          <p:cNvSpPr>
+            <a:spLocks noGrp="1"/>
+          </p:cNvSpPr>
+          <p:nvPr>
+            <p:ph type="title"/>
+          </p:nvPr>
+        </p:nvSpPr>
+        <p:spPr/>
+        <p:txBody>
+          <a:bodyPr/>
+          <a:lstStyle/>
+          <a:p>
+            <a:r>
+              <a:rPr lang="en-US" dirty="0"/>
+              <a:t>Appendix–Graphs</a:t>
+            </a:r>
+          </a:p>
+        </p:txBody>
+      </p:sp>
+      <p:sp>
+        <p:nvSpPr>
+          <p:cNvPr id="3" name="Content Placeholder 2">
+            <a:extLst>
+              <a:ext uri="{FF2B5EF4-FFF2-40B4-BE49-F238E27FC236}">
+                <a16:creationId xmlns:a16="http://schemas.microsoft.com/office/drawing/2014/main" id="{0E9644FE-7154-B793-C660-1E04373029AA}"/>
+              </a:ext>
+            </a:extLst>
+          </p:cNvPr>
+          <p:cNvSpPr>
+            <a:spLocks noGrp="1"/>
+          </p:cNvSpPr>
+          <p:nvPr>
+            <p:ph idx="1"/>
+          </p:nvPr>
+        </p:nvSpPr>
+        <p:spPr>
+          <a:xfrm>
+            <a:off x="1720850" y="5643559"/>
+            <a:ext cx="1536700" cy="457203"/>
+          </a:xfrm>
+        </p:spPr>
+        <p:txBody>
+          <a:bodyPr/>
+          <a:lstStyle/>
+          <a:p>
+            <a:r>
+              <a:rPr lang="en-US" dirty="0"/>
+              <a:t>Austin, TX</a:t>
+            </a:r>
+          </a:p>
+        </p:txBody>
+      </p:sp>
+      <p:pic>
+        <p:nvPicPr>
+          <p:cNvPr id="5" name="Picture 4">
+            <a:extLst>
+              <a:ext uri="{FF2B5EF4-FFF2-40B4-BE49-F238E27FC236}">
+                <a16:creationId xmlns:a16="http://schemas.microsoft.com/office/drawing/2014/main" id="{FC1794FC-309D-B277-4C84-E9B90113E7B7}"/>
+              </a:ext>
+            </a:extLst>
+          </p:cNvPr>
+          <p:cNvPicPr>
+            <a:picLocks noChangeAspect="1"/>
+          </p:cNvPicPr>
+          <p:nvPr/>
+        </p:nvPicPr>
+        <p:blipFill>
+          <a:blip r:embed="rId2"/>
+          <a:stretch>
+            <a:fillRect/>
+          </a:stretch>
+        </p:blipFill>
+        <p:spPr>
+          <a:xfrm>
+            <a:off x="711200" y="2743200"/>
+            <a:ext cx="3556000" cy="2565400"/>
+          </a:xfrm>
+          <a:prstGeom prst="rect">
+            <a:avLst/>
+          </a:prstGeom>
+        </p:spPr>
+      </p:pic>
+      <p:sp>
+        <p:nvSpPr>
+          <p:cNvPr id="6" name="Content Placeholder 2">
+            <a:extLst>
+              <a:ext uri="{FF2B5EF4-FFF2-40B4-BE49-F238E27FC236}">
+                <a16:creationId xmlns:a16="http://schemas.microsoft.com/office/drawing/2014/main" id="{CB636F4A-CE8E-232C-0B30-E789C808BEE6}"/>
+              </a:ext>
+            </a:extLst>
+          </p:cNvPr>
+          <p:cNvSpPr txBox="1">
+            <a:spLocks/>
+          </p:cNvSpPr>
+          <p:nvPr/>
+        </p:nvSpPr>
+        <p:spPr>
+          <a:xfrm>
+            <a:off x="5607050" y="5643559"/>
+            <a:ext cx="1536700" cy="457203"/>
+          </a:xfrm>
+          <a:prstGeom prst="rect">
+            <a:avLst/>
+          </a:prstGeom>
+        </p:spPr>
+        <p:txBody>
+          <a:bodyPr vert="horz" lIns="91440" tIns="45720" rIns="91440" bIns="45720" rtlCol="0">
+            <a:normAutofit/>
+          </a:bodyPr>
+          <a:lstStyle>
+            <a:lvl1pPr marL="228600" indent="-228600" algn="l" defTabSz="914400" rtl="0" eaLnBrk="1" latinLnBrk="0" hangingPunct="1">
+              <a:lnSpc>
+                <a:spcPct val="120000"/>
+              </a:lnSpc>
+              <a:spcBef>
+                <a:spcPts val="1000"/>
+              </a:spcBef>
+              <a:buFont typeface="Arial" panose="020B0604020202020204" pitchFamily="34" charset="0"/>
+              <a:buChar char="•"/>
+              <a:defRPr sz="1800" kern="1200">
+                <a:solidFill>
+                  <a:schemeClr val="tx1"/>
+                </a:solidFill>
+                <a:latin typeface="+mn-lt"/>
+                <a:ea typeface="+mn-ea"/>
+                <a:cs typeface="+mn-cs"/>
+              </a:defRPr>
+            </a:lvl1pPr>
+            <a:lvl2pPr marL="256032" indent="0" algn="l" defTabSz="914400" rtl="0" eaLnBrk="1" latinLnBrk="0" hangingPunct="1">
+              <a:lnSpc>
+                <a:spcPct val="120000"/>
+              </a:lnSpc>
+              <a:spcBef>
+                <a:spcPts val="500"/>
+              </a:spcBef>
+              <a:buFontTx/>
+              <a:buNone/>
+              <a:defRPr sz="1600" b="1" kern="1200">
+                <a:solidFill>
+                  <a:schemeClr val="tx1"/>
+                </a:solidFill>
+                <a:latin typeface="+mn-lt"/>
+                <a:ea typeface="+mn-ea"/>
+                <a:cs typeface="+mn-cs"/>
+              </a:defRPr>
+            </a:lvl2pPr>
+            <a:lvl3pPr marL="521208" indent="-228600" algn="l" defTabSz="914400" rtl="0" eaLnBrk="1" latinLnBrk="0" hangingPunct="1">
+              <a:lnSpc>
+                <a:spcPct val="120000"/>
+              </a:lnSpc>
+              <a:spcBef>
+                <a:spcPts val="500"/>
+              </a:spcBef>
+              <a:buFont typeface="Arial" panose="020B0604020202020204" pitchFamily="34" charset="0"/>
+              <a:buChar char="•"/>
+              <a:defRPr sz="1400" kern="1200">
+                <a:solidFill>
+                  <a:schemeClr val="tx1"/>
+                </a:solidFill>
+                <a:latin typeface="+mn-lt"/>
+                <a:ea typeface="+mn-ea"/>
+                <a:cs typeface="+mn-cs"/>
+              </a:defRPr>
+            </a:lvl3pPr>
+            <a:lvl4pPr marL="539496" indent="0" algn="l" defTabSz="914400" rtl="0" eaLnBrk="1" latinLnBrk="0" hangingPunct="1">
+              <a:lnSpc>
+                <a:spcPct val="120000"/>
+              </a:lnSpc>
+              <a:spcBef>
+                <a:spcPts val="500"/>
+              </a:spcBef>
+              <a:buFontTx/>
+              <a:buNone/>
+              <a:defRPr sz="1200" b="1" kern="1200">
+                <a:solidFill>
+                  <a:schemeClr val="tx1"/>
+                </a:solidFill>
+                <a:latin typeface="+mn-lt"/>
+                <a:ea typeface="+mn-ea"/>
+                <a:cs typeface="+mn-cs"/>
+              </a:defRPr>
+            </a:lvl4pPr>
+            <a:lvl5pPr marL="832104" indent="-228600" algn="l" defTabSz="914400" rtl="0" eaLnBrk="1" latinLnBrk="0" hangingPunct="1">
+              <a:lnSpc>
+                <a:spcPct val="120000"/>
+              </a:lnSpc>
+              <a:spcBef>
+                <a:spcPts val="500"/>
+              </a:spcBef>
+              <a:buFont typeface="Arial" panose="020B0604020202020204" pitchFamily="34" charset="0"/>
+              <a:buChar char="•"/>
+              <a:defRPr sz="1200" kern="1200">
+                <a:solidFill>
+                  <a:schemeClr val="tx1"/>
+                </a:solidFill>
+                <a:latin typeface="+mn-lt"/>
+                <a:ea typeface="+mn-ea"/>
+                <a:cs typeface="+mn-cs"/>
+              </a:defRPr>
+            </a:lvl5pPr>
+            <a:lvl6pPr marL="2514600" indent="-228600" algn="l" defTabSz="914400" rtl="0" eaLnBrk="1" latinLnBrk="0" hangingPunct="1">
+              <a:lnSpc>
+                <a:spcPct val="90000"/>
+              </a:lnSpc>
+              <a:spcBef>
+                <a:spcPts val="500"/>
+              </a:spcBef>
+              <a:buFont typeface="Arial" panose="020B0604020202020204" pitchFamily="34" charset="0"/>
+              <a:buChar char="•"/>
+              <a:defRPr sz="1800" kern="1200">
+                <a:solidFill>
+                  <a:schemeClr val="tx1"/>
+                </a:solidFill>
+                <a:latin typeface="+mn-lt"/>
+                <a:ea typeface="+mn-ea"/>
+                <a:cs typeface="+mn-cs"/>
+              </a:defRPr>
+            </a:lvl6pPr>
+            <a:lvl7pPr marL="2971800" indent="-228600" algn="l" defTabSz="914400" rtl="0" eaLnBrk="1" latinLnBrk="0" hangingPunct="1">
+              <a:lnSpc>
+                <a:spcPct val="90000"/>
+              </a:lnSpc>
+              <a:spcBef>
+                <a:spcPts val="500"/>
+              </a:spcBef>
+              <a:buFont typeface="Arial" panose="020B0604020202020204" pitchFamily="34" charset="0"/>
+              <a:buChar char="•"/>
+              <a:defRPr sz="1800" kern="1200">
+                <a:solidFill>
+                  <a:schemeClr val="tx1"/>
+                </a:solidFill>
+                <a:latin typeface="+mn-lt"/>
+                <a:ea typeface="+mn-ea"/>
+                <a:cs typeface="+mn-cs"/>
+              </a:defRPr>
+            </a:lvl7pPr>
+            <a:lvl8pPr marL="3429000" indent="-228600" algn="l" defTabSz="914400" rtl="0" eaLnBrk="1" latinLnBrk="0" hangingPunct="1">
+              <a:lnSpc>
+                <a:spcPct val="90000"/>
+              </a:lnSpc>
+              <a:spcBef>
+                <a:spcPts val="500"/>
+              </a:spcBef>
+              <a:buFont typeface="Arial" panose="020B0604020202020204" pitchFamily="34" charset="0"/>
+              <a:buChar char="•"/>
+              <a:defRPr sz="1800" kern="1200">
+                <a:solidFill>
+                  <a:schemeClr val="tx1"/>
+                </a:solidFill>
+                <a:latin typeface="+mn-lt"/>
+                <a:ea typeface="+mn-ea"/>
+                <a:cs typeface="+mn-cs"/>
+              </a:defRPr>
+            </a:lvl8pPr>
+            <a:lvl9pPr marL="3886200" indent="-228600" algn="l" defTabSz="914400" rtl="0" eaLnBrk="1" latinLnBrk="0" hangingPunct="1">
+              <a:lnSpc>
+                <a:spcPct val="90000"/>
+              </a:lnSpc>
+              <a:spcBef>
+                <a:spcPts val="500"/>
+              </a:spcBef>
+              <a:buFont typeface="Arial" panose="020B0604020202020204" pitchFamily="34" charset="0"/>
+              <a:buChar char="•"/>
+              <a:defRPr sz="1800" kern="1200">
+                <a:solidFill>
+                  <a:schemeClr val="tx1"/>
+                </a:solidFill>
+                <a:latin typeface="+mn-lt"/>
+                <a:ea typeface="+mn-ea"/>
+                <a:cs typeface="+mn-cs"/>
+              </a:defRPr>
+            </a:lvl9pPr>
+          </a:lstStyle>
+          <a:p>
+            <a:r>
+              <a:rPr lang="en-US" dirty="0"/>
+              <a:t>El Paso, TX</a:t>
+            </a:r>
+          </a:p>
+        </p:txBody>
+      </p:sp>
+      <p:sp>
+        <p:nvSpPr>
+          <p:cNvPr id="8" name="Content Placeholder 2">
+            <a:extLst>
+              <a:ext uri="{FF2B5EF4-FFF2-40B4-BE49-F238E27FC236}">
+                <a16:creationId xmlns:a16="http://schemas.microsoft.com/office/drawing/2014/main" id="{673644D3-7D11-3606-3594-150ACB1F58B4}"/>
+              </a:ext>
+            </a:extLst>
+          </p:cNvPr>
+          <p:cNvSpPr txBox="1">
+            <a:spLocks/>
+          </p:cNvSpPr>
+          <p:nvPr/>
+        </p:nvSpPr>
+        <p:spPr>
+          <a:xfrm>
+            <a:off x="9493250" y="5643559"/>
+            <a:ext cx="1536700" cy="457203"/>
+          </a:xfrm>
+          <a:prstGeom prst="rect">
+            <a:avLst/>
+          </a:prstGeom>
+        </p:spPr>
+        <p:txBody>
+          <a:bodyPr vert="horz" lIns="91440" tIns="45720" rIns="91440" bIns="45720" rtlCol="0">
+            <a:normAutofit/>
+          </a:bodyPr>
+          <a:lstStyle>
+            <a:lvl1pPr marL="228600" indent="-228600" algn="l" defTabSz="914400" rtl="0" eaLnBrk="1" latinLnBrk="0" hangingPunct="1">
+              <a:lnSpc>
+                <a:spcPct val="120000"/>
+              </a:lnSpc>
+              <a:spcBef>
+                <a:spcPts val="1000"/>
+              </a:spcBef>
+              <a:buFont typeface="Arial" panose="020B0604020202020204" pitchFamily="34" charset="0"/>
+              <a:buChar char="•"/>
+              <a:defRPr sz="1800" kern="1200">
+                <a:solidFill>
+                  <a:schemeClr val="tx1"/>
+                </a:solidFill>
+                <a:latin typeface="+mn-lt"/>
+                <a:ea typeface="+mn-ea"/>
+                <a:cs typeface="+mn-cs"/>
+              </a:defRPr>
+            </a:lvl1pPr>
+            <a:lvl2pPr marL="256032" indent="0" algn="l" defTabSz="914400" rtl="0" eaLnBrk="1" latinLnBrk="0" hangingPunct="1">
+              <a:lnSpc>
+                <a:spcPct val="120000"/>
+              </a:lnSpc>
+              <a:spcBef>
+                <a:spcPts val="500"/>
+              </a:spcBef>
+              <a:buFontTx/>
+              <a:buNone/>
+              <a:defRPr sz="1600" b="1" kern="1200">
+                <a:solidFill>
+                  <a:schemeClr val="tx1"/>
+                </a:solidFill>
+                <a:latin typeface="+mn-lt"/>
+                <a:ea typeface="+mn-ea"/>
+                <a:cs typeface="+mn-cs"/>
+              </a:defRPr>
+            </a:lvl2pPr>
+            <a:lvl3pPr marL="521208" indent="-228600" algn="l" defTabSz="914400" rtl="0" eaLnBrk="1" latinLnBrk="0" hangingPunct="1">
+              <a:lnSpc>
+                <a:spcPct val="120000"/>
+              </a:lnSpc>
+              <a:spcBef>
+                <a:spcPts val="500"/>
+              </a:spcBef>
+              <a:buFont typeface="Arial" panose="020B0604020202020204" pitchFamily="34" charset="0"/>
+              <a:buChar char="•"/>
+              <a:defRPr sz="1400" kern="1200">
+                <a:solidFill>
+                  <a:schemeClr val="tx1"/>
+                </a:solidFill>
+                <a:latin typeface="+mn-lt"/>
+                <a:ea typeface="+mn-ea"/>
+                <a:cs typeface="+mn-cs"/>
+              </a:defRPr>
+            </a:lvl3pPr>
+            <a:lvl4pPr marL="539496" indent="0" algn="l" defTabSz="914400" rtl="0" eaLnBrk="1" latinLnBrk="0" hangingPunct="1">
+              <a:lnSpc>
+                <a:spcPct val="120000"/>
+              </a:lnSpc>
+              <a:spcBef>
+                <a:spcPts val="500"/>
+              </a:spcBef>
+              <a:buFontTx/>
+              <a:buNone/>
+              <a:defRPr sz="1200" b="1" kern="1200">
+                <a:solidFill>
+                  <a:schemeClr val="tx1"/>
+                </a:solidFill>
+                <a:latin typeface="+mn-lt"/>
+                <a:ea typeface="+mn-ea"/>
+                <a:cs typeface="+mn-cs"/>
+              </a:defRPr>
+            </a:lvl4pPr>
+            <a:lvl5pPr marL="832104" indent="-228600" algn="l" defTabSz="914400" rtl="0" eaLnBrk="1" latinLnBrk="0" hangingPunct="1">
+              <a:lnSpc>
+                <a:spcPct val="120000"/>
+              </a:lnSpc>
+              <a:spcBef>
+                <a:spcPts val="500"/>
+              </a:spcBef>
+              <a:buFont typeface="Arial" panose="020B0604020202020204" pitchFamily="34" charset="0"/>
+              <a:buChar char="•"/>
+              <a:defRPr sz="1200" kern="1200">
+                <a:solidFill>
+                  <a:schemeClr val="tx1"/>
+                </a:solidFill>
+                <a:latin typeface="+mn-lt"/>
+                <a:ea typeface="+mn-ea"/>
+                <a:cs typeface="+mn-cs"/>
+              </a:defRPr>
+            </a:lvl5pPr>
+            <a:lvl6pPr marL="2514600" indent="-228600" algn="l" defTabSz="914400" rtl="0" eaLnBrk="1" latinLnBrk="0" hangingPunct="1">
+              <a:lnSpc>
+                <a:spcPct val="90000"/>
+              </a:lnSpc>
+              <a:spcBef>
+                <a:spcPts val="500"/>
+              </a:spcBef>
+              <a:buFont typeface="Arial" panose="020B0604020202020204" pitchFamily="34" charset="0"/>
+              <a:buChar char="•"/>
+              <a:defRPr sz="1800" kern="1200">
+                <a:solidFill>
+                  <a:schemeClr val="tx1"/>
+                </a:solidFill>
+                <a:latin typeface="+mn-lt"/>
+                <a:ea typeface="+mn-ea"/>
+                <a:cs typeface="+mn-cs"/>
+              </a:defRPr>
+            </a:lvl6pPr>
+            <a:lvl7pPr marL="2971800" indent="-228600" algn="l" defTabSz="914400" rtl="0" eaLnBrk="1" latinLnBrk="0" hangingPunct="1">
+              <a:lnSpc>
+                <a:spcPct val="90000"/>
+              </a:lnSpc>
+              <a:spcBef>
+                <a:spcPts val="500"/>
+              </a:spcBef>
+              <a:buFont typeface="Arial" panose="020B0604020202020204" pitchFamily="34" charset="0"/>
+              <a:buChar char="•"/>
+              <a:defRPr sz="1800" kern="1200">
+                <a:solidFill>
+                  <a:schemeClr val="tx1"/>
+                </a:solidFill>
+                <a:latin typeface="+mn-lt"/>
+                <a:ea typeface="+mn-ea"/>
+                <a:cs typeface="+mn-cs"/>
+              </a:defRPr>
+            </a:lvl7pPr>
+            <a:lvl8pPr marL="3429000" indent="-228600" algn="l" defTabSz="914400" rtl="0" eaLnBrk="1" latinLnBrk="0" hangingPunct="1">
+              <a:lnSpc>
+                <a:spcPct val="90000"/>
+              </a:lnSpc>
+              <a:spcBef>
+                <a:spcPts val="500"/>
+              </a:spcBef>
+              <a:buFont typeface="Arial" panose="020B0604020202020204" pitchFamily="34" charset="0"/>
+              <a:buChar char="•"/>
+              <a:defRPr sz="1800" kern="1200">
+                <a:solidFill>
+                  <a:schemeClr val="tx1"/>
+                </a:solidFill>
+                <a:latin typeface="+mn-lt"/>
+                <a:ea typeface="+mn-ea"/>
+                <a:cs typeface="+mn-cs"/>
+              </a:defRPr>
+            </a:lvl8pPr>
+            <a:lvl9pPr marL="3886200" indent="-228600" algn="l" defTabSz="914400" rtl="0" eaLnBrk="1" latinLnBrk="0" hangingPunct="1">
+              <a:lnSpc>
+                <a:spcPct val="90000"/>
+              </a:lnSpc>
+              <a:spcBef>
+                <a:spcPts val="500"/>
+              </a:spcBef>
+              <a:buFont typeface="Arial" panose="020B0604020202020204" pitchFamily="34" charset="0"/>
+              <a:buChar char="•"/>
+              <a:defRPr sz="1800" kern="1200">
+                <a:solidFill>
+                  <a:schemeClr val="tx1"/>
+                </a:solidFill>
+                <a:latin typeface="+mn-lt"/>
+                <a:ea typeface="+mn-ea"/>
+                <a:cs typeface="+mn-cs"/>
+              </a:defRPr>
+            </a:lvl9pPr>
+          </a:lstStyle>
+          <a:p>
+            <a:r>
+              <a:rPr lang="en-US" dirty="0"/>
+              <a:t>Atlanta, GA</a:t>
+            </a:r>
+          </a:p>
+        </p:txBody>
+      </p:sp>
+      <p:pic>
+        <p:nvPicPr>
+          <p:cNvPr id="10" name="Picture 9">
+            <a:extLst>
+              <a:ext uri="{FF2B5EF4-FFF2-40B4-BE49-F238E27FC236}">
+                <a16:creationId xmlns:a16="http://schemas.microsoft.com/office/drawing/2014/main" id="{53D82385-E2DB-11E0-4C74-ED94434B0BB4}"/>
+              </a:ext>
+            </a:extLst>
+          </p:cNvPr>
+          <p:cNvPicPr>
+            <a:picLocks noChangeAspect="1"/>
+          </p:cNvPicPr>
+          <p:nvPr/>
+        </p:nvPicPr>
+        <p:blipFill>
+          <a:blip r:embed="rId3"/>
+          <a:stretch>
+            <a:fillRect/>
+          </a:stretch>
+        </p:blipFill>
+        <p:spPr>
+          <a:xfrm>
+            <a:off x="4597400" y="2743200"/>
+            <a:ext cx="3556000" cy="2565400"/>
+          </a:xfrm>
+          <a:prstGeom prst="rect">
+            <a:avLst/>
+          </a:prstGeom>
+        </p:spPr>
+      </p:pic>
+      <p:pic>
+        <p:nvPicPr>
+          <p:cNvPr id="11" name="Picture 10">
+            <a:extLst>
+              <a:ext uri="{FF2B5EF4-FFF2-40B4-BE49-F238E27FC236}">
+                <a16:creationId xmlns:a16="http://schemas.microsoft.com/office/drawing/2014/main" id="{CF7B4EF6-5401-2BB1-87A2-37D985ABCE59}"/>
+              </a:ext>
+            </a:extLst>
+          </p:cNvPr>
+          <p:cNvPicPr>
+            <a:picLocks noChangeAspect="1"/>
+          </p:cNvPicPr>
+          <p:nvPr/>
+        </p:nvPicPr>
+        <p:blipFill>
+          <a:blip r:embed="rId4"/>
+          <a:stretch>
+            <a:fillRect/>
+          </a:stretch>
+        </p:blipFill>
+        <p:spPr>
+          <a:xfrm>
+            <a:off x="8356600" y="2730500"/>
+            <a:ext cx="3556000" cy="2578100"/>
+          </a:xfrm>
+          <a:prstGeom prst="rect">
+            <a:avLst/>
+          </a:prstGeom>
+        </p:spPr>
+      </p:pic>
+    </p:spTree>
+    <p:extLst>
+      <p:ext uri="{BB962C8B-B14F-4D97-AF65-F5344CB8AC3E}">
+        <p14:creationId xmlns:p14="http://schemas.microsoft.com/office/powerpoint/2010/main" val="730440992"/>
+      </p:ext>
+    </p:extLst>
+  </p:cSld>
+  <p:clrMapOvr>
+    <a:masterClrMapping/>
+  </p:clrMapOvr>
+</p:sld>
+</file>
+
+<file path=ppt/slides/slide11.xml><?xml version="1.0" encoding="utf-8"?>
+<p:sld xmlns:a="http://schemas.openxmlformats.org/drawingml/2006/main" xmlns:r="http://schemas.openxmlformats.org/officeDocument/2006/relationships" xmlns:p="http://schemas.openxmlformats.org/presentationml/2006/main">
+  <p:cSld>
     <p:bg>
       <p:bgPr>
         <a:solidFill>

</xml_diff>